<commit_message>
Mise à jour de la présentation et ajout de bibliographie sur les transformations sur OpenGL
</commit_message>
<xml_diff>
--- a/doc/presentationCopil/presentationVersion25Mars.pptx
+++ b/doc/presentationCopil/presentationVersion25Mars.pptx
@@ -273,7 +273,7 @@
             <a:fld id="{5E8C758F-8F07-403C-AAD9-D1770A0D36CA}" type="datetimeFigureOut">
               <a:rPr lang="fr-FR" smtClean="0"/>
               <a:pPr/>
-              <a:t>24/03/2015</a:t>
+              <a:t>25/03/2015</a:t>
             </a:fld>
             <a:endParaRPr lang="fr-FR"/>
           </a:p>
@@ -441,7 +441,7 @@
             <a:fld id="{B9B9BE96-BA76-4200-812F-A8239A37214B}" type="datetimeFigureOut">
               <a:rPr lang="fr-FR" smtClean="0"/>
               <a:pPr/>
-              <a:t>24/03/2015</a:t>
+              <a:t>25/03/2015</a:t>
             </a:fld>
             <a:endParaRPr lang="fr-FR"/>
           </a:p>
@@ -796,6 +796,91 @@
 </p:notes>
 </file>
 
+<file path=ppt/notesSlides/notesSlide10.xml><?xml version="1.0" encoding="utf-8"?>
+<p:notes xmlns:a="http://schemas.openxmlformats.org/drawingml/2006/main" xmlns:r="http://schemas.openxmlformats.org/officeDocument/2006/relationships" xmlns:p="http://schemas.openxmlformats.org/presentationml/2006/main">
+  <p:cSld>
+    <p:spTree>
+      <p:nvGrpSpPr>
+        <p:cNvPr id="1" name=""/>
+        <p:cNvGrpSpPr/>
+        <p:nvPr/>
+      </p:nvGrpSpPr>
+      <p:grpSpPr>
+        <a:xfrm>
+          <a:off x="0" y="0"/>
+          <a:ext cx="0" cy="0"/>
+          <a:chOff x="0" y="0"/>
+          <a:chExt cx="0" cy="0"/>
+        </a:xfrm>
+      </p:grpSpPr>
+      <p:sp>
+        <p:nvSpPr>
+          <p:cNvPr id="2" name="Espace réservé de l'image des diapositives 1"/>
+          <p:cNvSpPr>
+            <a:spLocks noGrp="1" noRot="1" noChangeAspect="1"/>
+          </p:cNvSpPr>
+          <p:nvPr>
+            <p:ph type="sldImg"/>
+          </p:nvPr>
+        </p:nvSpPr>
+        <p:spPr/>
+      </p:sp>
+      <p:sp>
+        <p:nvSpPr>
+          <p:cNvPr id="3" name="Espace réservé des commentaires 2"/>
+          <p:cNvSpPr>
+            <a:spLocks noGrp="1"/>
+          </p:cNvSpPr>
+          <p:nvPr>
+            <p:ph type="body" idx="1"/>
+          </p:nvPr>
+        </p:nvSpPr>
+        <p:spPr/>
+        <p:txBody>
+          <a:bodyPr/>
+          <a:lstStyle/>
+          <a:p>
+            <a:endParaRPr lang="fr-FR"/>
+          </a:p>
+        </p:txBody>
+      </p:sp>
+      <p:sp>
+        <p:nvSpPr>
+          <p:cNvPr id="4" name="Espace réservé du numéro de diapositive 3"/>
+          <p:cNvSpPr>
+            <a:spLocks noGrp="1"/>
+          </p:cNvSpPr>
+          <p:nvPr>
+            <p:ph type="sldNum" sz="quarter" idx="10"/>
+          </p:nvPr>
+        </p:nvSpPr>
+        <p:spPr/>
+        <p:txBody>
+          <a:bodyPr/>
+          <a:lstStyle/>
+          <a:p>
+            <a:fld id="{67CECCD7-22E7-4EC2-A4CB-540BF85E41A4}" type="slidenum">
+              <a:rPr lang="fr-FR" smtClean="0"/>
+              <a:pPr/>
+              <a:t>20</a:t>
+            </a:fld>
+            <a:endParaRPr lang="fr-FR"/>
+          </a:p>
+        </p:txBody>
+      </p:sp>
+    </p:spTree>
+    <p:extLst>
+      <p:ext uri="{BB962C8B-B14F-4D97-AF65-F5344CB8AC3E}">
+        <p14:creationId xmlns:p14="http://schemas.microsoft.com/office/powerpoint/2010/main" val="4113625077"/>
+      </p:ext>
+    </p:extLst>
+  </p:cSld>
+  <p:clrMapOvr>
+    <a:masterClrMapping/>
+  </p:clrMapOvr>
+</p:notes>
+</file>
+
 <file path=ppt/notesSlides/notesSlide2.xml><?xml version="1.0" encoding="utf-8"?>
 <p:notes xmlns:a="http://schemas.openxmlformats.org/drawingml/2006/main" xmlns:r="http://schemas.openxmlformats.org/officeDocument/2006/relationships" xmlns:p="http://schemas.openxmlformats.org/presentationml/2006/main">
   <p:cSld>
@@ -908,12 +993,7 @@
             <p:ph type="sldImg"/>
           </p:nvPr>
         </p:nvSpPr>
-        <p:spPr>
-          <a:xfrm>
-            <a:off x="1371600" y="1143000"/>
-            <a:ext cx="4114800" cy="3086100"/>
-          </a:xfrm>
-        </p:spPr>
+        <p:spPr/>
       </p:sp>
       <p:sp>
         <p:nvSpPr>
@@ -931,8 +1011,26 @@
           <a:lstStyle/>
           <a:p>
             <a:r>
+              <a:rPr lang="fr-FR" dirty="0" err="1" smtClean="0"/>
+              <a:t>iTowns</a:t>
+            </a:r>
+            <a:r>
               <a:rPr lang="fr-FR" dirty="0" smtClean="0"/>
-              <a:t>PAS BESOIN de considérer insertion / suppression d’un point</a:t>
+              <a:t>: plateforme de navigation immersive</a:t>
+            </a:r>
+          </a:p>
+          <a:p>
+            <a:r>
+              <a:rPr lang="fr-FR" dirty="0" smtClean="0"/>
+              <a:t>Permet de naviguer virtuellement dans une acquisition de </a:t>
+            </a:r>
+            <a:r>
+              <a:rPr lang="fr-FR" dirty="0" err="1" smtClean="0"/>
+              <a:t>Stéréopolis</a:t>
+            </a:r>
+            <a:r>
+              <a:rPr lang="fr-FR" dirty="0" smtClean="0"/>
+              <a:t> depuis internet</a:t>
             </a:r>
             <a:endParaRPr lang="fr-FR" dirty="0"/>
           </a:p>
@@ -956,7 +1054,7 @@
             <a:fld id="{67CECCD7-22E7-4EC2-A4CB-540BF85E41A4}" type="slidenum">
               <a:rPr lang="fr-FR" smtClean="0"/>
               <a:pPr/>
-              <a:t>6</a:t>
+              <a:t>4</a:t>
             </a:fld>
             <a:endParaRPr lang="fr-FR"/>
           </a:p>
@@ -965,7 +1063,7 @@
     </p:spTree>
     <p:extLst>
       <p:ext uri="{BB962C8B-B14F-4D97-AF65-F5344CB8AC3E}">
-        <p14:creationId xmlns:p14="http://schemas.microsoft.com/office/powerpoint/2010/main" val="4159321522"/>
+        <p14:creationId xmlns:p14="http://schemas.microsoft.com/office/powerpoint/2010/main" val="655873"/>
       </p:ext>
     </p:extLst>
   </p:cSld>
@@ -1024,7 +1122,11 @@
           <a:bodyPr/>
           <a:lstStyle/>
           <a:p>
-            <a:endParaRPr lang="fr-FR"/>
+            <a:r>
+              <a:rPr lang="fr-FR" dirty="0" smtClean="0"/>
+              <a:t>PAS BESOIN de considérer insertion / suppression d’un point</a:t>
+            </a:r>
+            <a:endParaRPr lang="fr-FR" dirty="0"/>
           </a:p>
         </p:txBody>
       </p:sp>
@@ -1046,7 +1148,7 @@
             <a:fld id="{67CECCD7-22E7-4EC2-A4CB-540BF85E41A4}" type="slidenum">
               <a:rPr lang="fr-FR" smtClean="0"/>
               <a:pPr/>
-              <a:t>7</a:t>
+              <a:t>6</a:t>
             </a:fld>
             <a:endParaRPr lang="fr-FR"/>
           </a:p>
@@ -1055,7 +1157,7 @@
     </p:spTree>
     <p:extLst>
       <p:ext uri="{BB962C8B-B14F-4D97-AF65-F5344CB8AC3E}">
-        <p14:creationId xmlns:p14="http://schemas.microsoft.com/office/powerpoint/2010/main" val="2616446012"/>
+        <p14:creationId xmlns:p14="http://schemas.microsoft.com/office/powerpoint/2010/main" val="4159321522"/>
       </p:ext>
     </p:extLst>
   </p:cSld>
@@ -1092,96 +1194,51 @@
             <p:ph type="sldImg"/>
           </p:nvPr>
         </p:nvSpPr>
+        <p:spPr>
+          <a:xfrm>
+            <a:off x="1371600" y="1143000"/>
+            <a:ext cx="4114800" cy="3086100"/>
+          </a:xfrm>
+        </p:spPr>
+      </p:sp>
+      <p:sp>
+        <p:nvSpPr>
+          <p:cNvPr id="3" name="Espace réservé des commentaires 2"/>
+          <p:cNvSpPr>
+            <a:spLocks noGrp="1"/>
+          </p:cNvSpPr>
+          <p:nvPr>
+            <p:ph type="body" idx="1"/>
+          </p:nvPr>
+        </p:nvSpPr>
         <p:spPr/>
-      </p:sp>
-      <p:sp>
-        <p:nvSpPr>
-          <p:cNvPr id="3" name="Espace réservé des commentaires 2"/>
-          <p:cNvSpPr>
-            <a:spLocks noGrp="1"/>
-          </p:cNvSpPr>
-          <p:nvPr>
-            <p:ph type="body" idx="1"/>
+        <p:txBody>
+          <a:bodyPr/>
+          <a:lstStyle/>
+          <a:p>
+            <a:endParaRPr lang="fr-FR"/>
+          </a:p>
+        </p:txBody>
+      </p:sp>
+      <p:sp>
+        <p:nvSpPr>
+          <p:cNvPr id="4" name="Espace réservé du numéro de diapositive 3"/>
+          <p:cNvSpPr>
+            <a:spLocks noGrp="1"/>
+          </p:cNvSpPr>
+          <p:nvPr>
+            <p:ph type="sldNum" sz="quarter" idx="10"/>
           </p:nvPr>
         </p:nvSpPr>
         <p:spPr/>
         <p:txBody>
-          <a:bodyPr>
-            <a:normAutofit/>
-          </a:bodyPr>
-          <a:lstStyle/>
-          <a:p>
-            <a:r>
-              <a:rPr lang="fr-FR" sz="1200" b="1" dirty="0" smtClean="0"/>
-              <a:t>dans lesquels chaque nœud contient un point en dimension k. Un arbre k-d </a:t>
-            </a:r>
-            <a:r>
-              <a:rPr lang="fr-FR" sz="1200" b="1" dirty="0" err="1" smtClean="0"/>
-              <a:t>tree</a:t>
-            </a:r>
-            <a:r>
-              <a:rPr lang="fr-FR" sz="1200" b="1" dirty="0" smtClean="0"/>
-              <a:t> ( k-</a:t>
-            </a:r>
-            <a:r>
-              <a:rPr lang="fr-FR" sz="1200" b="1" dirty="0" err="1" smtClean="0"/>
-              <a:t>dimensional</a:t>
-            </a:r>
-            <a:r>
-              <a:rPr lang="fr-FR" sz="1200" b="1" dirty="0" smtClean="0"/>
-              <a:t> </a:t>
-            </a:r>
-            <a:r>
-              <a:rPr lang="fr-FR" sz="1200" b="1" dirty="0" err="1" smtClean="0"/>
-              <a:t>tree</a:t>
-            </a:r>
-            <a:r>
-              <a:rPr lang="fr-FR" sz="1200" b="1" dirty="0" smtClean="0"/>
-              <a:t>) est une </a:t>
-            </a:r>
-            <a:r>
-              <a:rPr lang="fr-FR" sz="1200" b="1" dirty="0" smtClean="0">
-                <a:hlinkClick r:id="rId3" tooltip="Structure de données"/>
-              </a:rPr>
-              <a:t>structure de données</a:t>
-            </a:r>
-            <a:r>
-              <a:rPr lang="fr-FR" sz="1200" b="1" dirty="0" smtClean="0"/>
-              <a:t> de partition de l'espace permettant de stocker des </a:t>
-            </a:r>
-            <a:r>
-              <a:rPr lang="fr-FR" sz="1200" b="1" dirty="0" smtClean="0">
-                <a:hlinkClick r:id="rId4" tooltip="Point"/>
-              </a:rPr>
-              <a:t>points</a:t>
-            </a:r>
-            <a:r>
-              <a:rPr lang="fr-FR" sz="1200" b="1" dirty="0" smtClean="0"/>
-              <a:t> </a:t>
-            </a:r>
-            <a:endParaRPr lang="fr-FR" dirty="0"/>
-          </a:p>
-        </p:txBody>
-      </p:sp>
-      <p:sp>
-        <p:nvSpPr>
-          <p:cNvPr id="4" name="Espace réservé du numéro de diapositive 3"/>
-          <p:cNvSpPr>
-            <a:spLocks noGrp="1"/>
-          </p:cNvSpPr>
-          <p:nvPr>
-            <p:ph type="sldNum" sz="quarter" idx="10"/>
-          </p:nvPr>
-        </p:nvSpPr>
-        <p:spPr/>
-        <p:txBody>
           <a:bodyPr/>
           <a:lstStyle/>
           <a:p>
             <a:fld id="{67CECCD7-22E7-4EC2-A4CB-540BF85E41A4}" type="slidenum">
               <a:rPr lang="fr-FR" smtClean="0"/>
               <a:pPr/>
-              <a:t>9</a:t>
+              <a:t>7</a:t>
             </a:fld>
             <a:endParaRPr lang="fr-FR"/>
           </a:p>
@@ -1190,7 +1247,7 @@
     </p:spTree>
     <p:extLst>
       <p:ext uri="{BB962C8B-B14F-4D97-AF65-F5344CB8AC3E}">
-        <p14:creationId xmlns:p14="http://schemas.microsoft.com/office/powerpoint/2010/main" val="2447106410"/>
+        <p14:creationId xmlns:p14="http://schemas.microsoft.com/office/powerpoint/2010/main" val="2616446012"/>
       </p:ext>
     </p:extLst>
   </p:cSld>
@@ -1244,26 +1301,189 @@
           <a:bodyPr/>
           <a:lstStyle/>
           <a:p>
-            <a:r>
-              <a:rPr lang="fr-FR" dirty="0" smtClean="0"/>
-              <a:t>Besoin </a:t>
-            </a:r>
-            <a:r>
-              <a:rPr lang="fr-FR" baseline="0" dirty="0" smtClean="0"/>
-              <a:t>: stocker =&gt; OK</a:t>
-            </a:r>
-          </a:p>
-          <a:p>
-            <a:r>
-              <a:rPr lang="fr-FR" baseline="0" dirty="0" smtClean="0"/>
-              <a:t>Besoin : accéder rapidement : proposition de la BD (dupliquer pour trouver plus vite), proposition des fichiers (voisinage)</a:t>
-            </a:r>
-          </a:p>
-          <a:p>
-            <a:r>
-              <a:rPr lang="fr-FR" baseline="0" dirty="0" smtClean="0"/>
-              <a:t>Reste, inutile.</a:t>
-            </a:r>
+            <a:pPr lvl="0"/>
+            <a:r>
+              <a:rPr lang="fr-FR" sz="1200" b="1" kern="1200" dirty="0" smtClean="0">
+                <a:solidFill>
+                  <a:schemeClr val="tx1"/>
+                </a:solidFill>
+                <a:effectLst/>
+                <a:latin typeface="+mn-lt"/>
+                <a:ea typeface="+mn-ea"/>
+                <a:cs typeface="+mn-cs"/>
+              </a:rPr>
+              <a:t>Avantages</a:t>
+            </a:r>
+          </a:p>
+          <a:p>
+            <a:pPr lvl="0"/>
+            <a:r>
+              <a:rPr lang="fr-FR" sz="1200" kern="1200" dirty="0" smtClean="0">
+                <a:solidFill>
+                  <a:schemeClr val="tx1"/>
+                </a:solidFill>
+                <a:effectLst/>
+                <a:latin typeface="+mn-lt"/>
+                <a:ea typeface="+mn-ea"/>
+                <a:cs typeface="+mn-cs"/>
+              </a:rPr>
+              <a:t>Méthode de représentation hiérarchique : visualisation multi-échelle (multi-résolution)</a:t>
+            </a:r>
+          </a:p>
+          <a:p>
+            <a:pPr lvl="0"/>
+            <a:r>
+              <a:rPr lang="fr-FR" sz="1200" kern="1200" dirty="0" smtClean="0">
+                <a:solidFill>
+                  <a:schemeClr val="tx1"/>
+                </a:solidFill>
+                <a:effectLst/>
+                <a:latin typeface="+mn-lt"/>
+                <a:ea typeface="+mn-ea"/>
+                <a:cs typeface="+mn-cs"/>
+              </a:rPr>
+              <a:t>Construction et exploration simples (de manière récursive)</a:t>
+            </a:r>
+          </a:p>
+          <a:p>
+            <a:pPr lvl="0"/>
+            <a:r>
+              <a:rPr lang="fr-FR" sz="1200" kern="1200" dirty="0" smtClean="0">
+                <a:solidFill>
+                  <a:schemeClr val="tx1"/>
+                </a:solidFill>
+                <a:effectLst/>
+                <a:latin typeface="+mn-lt"/>
+                <a:ea typeface="+mn-ea"/>
+                <a:cs typeface="+mn-cs"/>
+              </a:rPr>
+              <a:t> Méthode facile à tester les intersections avec d’autres objets</a:t>
+            </a:r>
+          </a:p>
+          <a:p>
+            <a:pPr lvl="0"/>
+            <a:r>
+              <a:rPr lang="fr-FR" sz="1200" kern="1200" dirty="0" smtClean="0">
+                <a:solidFill>
+                  <a:schemeClr val="tx1"/>
+                </a:solidFill>
+                <a:effectLst/>
+                <a:latin typeface="+mn-lt"/>
+                <a:ea typeface="+mn-ea"/>
+                <a:cs typeface="+mn-cs"/>
+              </a:rPr>
+              <a:t>Possibilité de visualiser les objets en 3 dimensions</a:t>
+            </a:r>
+          </a:p>
+          <a:p>
+            <a:pPr lvl="0"/>
+            <a:r>
+              <a:rPr lang="fr-FR" sz="1200" kern="1200" dirty="0" smtClean="0">
+                <a:solidFill>
+                  <a:schemeClr val="tx1"/>
+                </a:solidFill>
+                <a:effectLst/>
+                <a:latin typeface="+mn-lt"/>
+                <a:ea typeface="+mn-ea"/>
+                <a:cs typeface="+mn-cs"/>
+              </a:rPr>
+              <a:t>Primitive géométrique est simple : cube</a:t>
+            </a:r>
+          </a:p>
+          <a:p>
+            <a:pPr lvl="0"/>
+            <a:r>
+              <a:rPr lang="fr-FR" sz="1200" kern="1200" dirty="0" smtClean="0">
+                <a:solidFill>
+                  <a:schemeClr val="tx1"/>
+                </a:solidFill>
+                <a:effectLst/>
+                <a:latin typeface="+mn-lt"/>
+                <a:ea typeface="+mn-ea"/>
+                <a:cs typeface="+mn-cs"/>
+              </a:rPr>
+              <a:t>Utilisation d’un seul algorithme pour analyser et manipuler tous les objets contenus dans le cube</a:t>
+            </a:r>
+          </a:p>
+          <a:p>
+            <a:endParaRPr lang="fr-FR" dirty="0" smtClean="0"/>
+          </a:p>
+          <a:p>
+            <a:pPr lvl="0"/>
+            <a:r>
+              <a:rPr lang="fr-FR" sz="1200" b="1" kern="1200" dirty="0" smtClean="0">
+                <a:solidFill>
+                  <a:schemeClr val="tx1"/>
+                </a:solidFill>
+                <a:effectLst/>
+                <a:latin typeface="+mn-lt"/>
+                <a:ea typeface="+mn-ea"/>
+                <a:cs typeface="+mn-cs"/>
+              </a:rPr>
+              <a:t>Inconvénients</a:t>
+            </a:r>
+          </a:p>
+          <a:p>
+            <a:pPr lvl="0"/>
+            <a:r>
+              <a:rPr lang="fr-FR" sz="1200" kern="1200" dirty="0" smtClean="0">
+                <a:solidFill>
+                  <a:schemeClr val="tx1"/>
+                </a:solidFill>
+                <a:effectLst/>
+                <a:latin typeface="+mn-lt"/>
+                <a:ea typeface="+mn-ea"/>
+                <a:cs typeface="+mn-cs"/>
+              </a:rPr>
+              <a:t>Le rendu est coûteux en temps de calcul pour les scènes complexes</a:t>
+            </a:r>
+          </a:p>
+          <a:p>
+            <a:pPr lvl="0"/>
+            <a:r>
+              <a:rPr lang="fr-FR" sz="1200" kern="1200" dirty="0" smtClean="0">
+                <a:solidFill>
+                  <a:schemeClr val="tx1"/>
+                </a:solidFill>
+                <a:effectLst/>
+                <a:latin typeface="+mn-lt"/>
+                <a:ea typeface="+mn-ea"/>
+                <a:cs typeface="+mn-cs"/>
+              </a:rPr>
+              <a:t>Stockage du vide</a:t>
+            </a:r>
+          </a:p>
+          <a:p>
+            <a:pPr lvl="0"/>
+            <a:r>
+              <a:rPr lang="fr-FR" sz="1200" kern="1200" dirty="0" smtClean="0">
+                <a:solidFill>
+                  <a:schemeClr val="tx1"/>
+                </a:solidFill>
+                <a:effectLst/>
+                <a:latin typeface="+mn-lt"/>
+                <a:ea typeface="+mn-ea"/>
+                <a:cs typeface="+mn-cs"/>
+              </a:rPr>
+              <a:t>Nécessite beaucoup de mémoire pour le stockage d’un grand nombre de cubes</a:t>
+            </a:r>
+          </a:p>
+          <a:p>
+            <a:pPr lvl="0"/>
+            <a:r>
+              <a:rPr lang="fr-FR" sz="1200" kern="1200" dirty="0" smtClean="0">
+                <a:solidFill>
+                  <a:schemeClr val="tx1"/>
+                </a:solidFill>
+                <a:effectLst/>
+                <a:latin typeface="+mn-lt"/>
+                <a:ea typeface="+mn-ea"/>
+                <a:cs typeface="+mn-cs"/>
+              </a:rPr>
+              <a:t>Une représentation approximative des scènes ou des objets.</a:t>
+            </a:r>
+          </a:p>
+          <a:p>
             <a:endParaRPr lang="fr-FR" dirty="0"/>
           </a:p>
         </p:txBody>
@@ -1286,7 +1506,7 @@
             <a:fld id="{67CECCD7-22E7-4EC2-A4CB-540BF85E41A4}" type="slidenum">
               <a:rPr lang="fr-FR" smtClean="0"/>
               <a:pPr/>
-              <a:t>13</a:t>
+              <a:t>8</a:t>
             </a:fld>
             <a:endParaRPr lang="fr-FR"/>
           </a:p>
@@ -1295,7 +1515,7 @@
     </p:spTree>
     <p:extLst>
       <p:ext uri="{BB962C8B-B14F-4D97-AF65-F5344CB8AC3E}">
-        <p14:creationId xmlns:p14="http://schemas.microsoft.com/office/powerpoint/2010/main" val="3755842108"/>
+        <p14:creationId xmlns:p14="http://schemas.microsoft.com/office/powerpoint/2010/main" val="1083539537"/>
       </p:ext>
     </p:extLst>
   </p:cSld>
@@ -1346,38 +1566,59 @@
         </p:nvSpPr>
         <p:spPr/>
         <p:txBody>
-          <a:bodyPr/>
-          <a:lstStyle/>
-          <a:p>
-            <a:r>
-              <a:rPr lang="fr-FR" dirty="0" smtClean="0"/>
-              <a:t>Méthode agile : commanditaire</a:t>
-            </a:r>
-            <a:r>
-              <a:rPr lang="fr-FR" baseline="0" dirty="0" smtClean="0"/>
-              <a:t> impliqué dans le projet, réunions fréquentes, les acteurs savent précisément ce que les autres font</a:t>
-            </a:r>
-          </a:p>
-          <a:p>
-            <a:r>
-              <a:rPr lang="fr-FR" baseline="0" dirty="0" smtClean="0"/>
-              <a:t>Sur </a:t>
-            </a:r>
-            <a:r>
-              <a:rPr lang="fr-FR" baseline="0" dirty="0" err="1" smtClean="0"/>
-              <a:t>GitHub</a:t>
-            </a:r>
-            <a:r>
-              <a:rPr lang="fr-FR" baseline="0" dirty="0" smtClean="0"/>
-              <a:t>, on a tout, gestion de projet en /doc/</a:t>
-            </a:r>
-            <a:r>
-              <a:rPr lang="fr-FR" baseline="0" dirty="0" err="1" smtClean="0"/>
-              <a:t>proj</a:t>
-            </a:r>
-            <a:endParaRPr lang="fr-FR" dirty="0" smtClean="0"/>
-          </a:p>
-          <a:p>
+          <a:bodyPr>
+            <a:normAutofit/>
+          </a:bodyPr>
+          <a:lstStyle/>
+          <a:p>
+            <a:r>
+              <a:rPr lang="fr-FR" sz="1200" b="1" dirty="0" smtClean="0"/>
+              <a:t>dans lesquels chaque nœud contient un point en dimension k. Un arbre k-d </a:t>
+            </a:r>
+            <a:r>
+              <a:rPr lang="fr-FR" sz="1200" b="1" dirty="0" err="1" smtClean="0"/>
+              <a:t>tree</a:t>
+            </a:r>
+            <a:r>
+              <a:rPr lang="fr-FR" sz="1200" b="1" dirty="0" smtClean="0"/>
+              <a:t> ( k-</a:t>
+            </a:r>
+            <a:r>
+              <a:rPr lang="fr-FR" sz="1200" b="1" dirty="0" err="1" smtClean="0"/>
+              <a:t>dimensional</a:t>
+            </a:r>
+            <a:r>
+              <a:rPr lang="fr-FR" sz="1200" b="1" dirty="0" smtClean="0"/>
+              <a:t> </a:t>
+            </a:r>
+            <a:r>
+              <a:rPr lang="fr-FR" sz="1200" b="1" dirty="0" err="1" smtClean="0"/>
+              <a:t>tree</a:t>
+            </a:r>
+            <a:r>
+              <a:rPr lang="fr-FR" sz="1200" b="1" dirty="0" smtClean="0"/>
+              <a:t>) est une </a:t>
+            </a:r>
+            <a:r>
+              <a:rPr lang="fr-FR" sz="1200" b="1" dirty="0" smtClean="0">
+                <a:hlinkClick r:id="rId3" tooltip="Structure de données"/>
+              </a:rPr>
+              <a:t>structure de données</a:t>
+            </a:r>
+            <a:r>
+              <a:rPr lang="fr-FR" sz="1200" b="1" dirty="0" smtClean="0"/>
+              <a:t> de partition de l'espace permettant de stocker des </a:t>
+            </a:r>
+            <a:r>
+              <a:rPr lang="fr-FR" sz="1200" b="1" dirty="0" smtClean="0">
+                <a:hlinkClick r:id="rId4" tooltip="Point"/>
+              </a:rPr>
+              <a:t>points</a:t>
+            </a:r>
+            <a:r>
+              <a:rPr lang="fr-FR" sz="1200" b="1" dirty="0" smtClean="0"/>
+              <a:t> </a:t>
+            </a:r>
             <a:endParaRPr lang="fr-FR" dirty="0"/>
           </a:p>
         </p:txBody>
@@ -1400,7 +1641,7 @@
             <a:fld id="{67CECCD7-22E7-4EC2-A4CB-540BF85E41A4}" type="slidenum">
               <a:rPr lang="fr-FR" smtClean="0"/>
               <a:pPr/>
-              <a:t>18</a:t>
+              <a:t>9</a:t>
             </a:fld>
             <a:endParaRPr lang="fr-FR"/>
           </a:p>
@@ -1409,7 +1650,7 @@
     </p:spTree>
     <p:extLst>
       <p:ext uri="{BB962C8B-B14F-4D97-AF65-F5344CB8AC3E}">
-        <p14:creationId xmlns:p14="http://schemas.microsoft.com/office/powerpoint/2010/main" val="1643535083"/>
+        <p14:creationId xmlns:p14="http://schemas.microsoft.com/office/powerpoint/2010/main" val="2447106410"/>
       </p:ext>
     </p:extLst>
   </p:cSld>
@@ -1463,7 +1704,27 @@
           <a:bodyPr/>
           <a:lstStyle/>
           <a:p>
-            <a:endParaRPr lang="fr-FR"/>
+            <a:r>
+              <a:rPr lang="fr-FR" dirty="0" smtClean="0"/>
+              <a:t>Besoin </a:t>
+            </a:r>
+            <a:r>
+              <a:rPr lang="fr-FR" baseline="0" dirty="0" smtClean="0"/>
+              <a:t>: stocker =&gt; OK</a:t>
+            </a:r>
+          </a:p>
+          <a:p>
+            <a:r>
+              <a:rPr lang="fr-FR" baseline="0" dirty="0" smtClean="0"/>
+              <a:t>Besoin : accéder rapidement : proposition de la BD (dupliquer pour trouver plus vite), proposition des fichiers (voisinage)</a:t>
+            </a:r>
+          </a:p>
+          <a:p>
+            <a:r>
+              <a:rPr lang="fr-FR" baseline="0" dirty="0" smtClean="0"/>
+              <a:t>Reste, inutile.</a:t>
+            </a:r>
+            <a:endParaRPr lang="fr-FR" dirty="0"/>
           </a:p>
         </p:txBody>
       </p:sp>
@@ -1485,7 +1746,7 @@
             <a:fld id="{67CECCD7-22E7-4EC2-A4CB-540BF85E41A4}" type="slidenum">
               <a:rPr lang="fr-FR" smtClean="0"/>
               <a:pPr/>
-              <a:t>20</a:t>
+              <a:t>13</a:t>
             </a:fld>
             <a:endParaRPr lang="fr-FR"/>
           </a:p>
@@ -1494,7 +1755,121 @@
     </p:spTree>
     <p:extLst>
       <p:ext uri="{BB962C8B-B14F-4D97-AF65-F5344CB8AC3E}">
-        <p14:creationId xmlns:p14="http://schemas.microsoft.com/office/powerpoint/2010/main" val="4113625077"/>
+        <p14:creationId xmlns:p14="http://schemas.microsoft.com/office/powerpoint/2010/main" val="3755842108"/>
+      </p:ext>
+    </p:extLst>
+  </p:cSld>
+  <p:clrMapOvr>
+    <a:masterClrMapping/>
+  </p:clrMapOvr>
+</p:notes>
+</file>
+
+<file path=ppt/notesSlides/notesSlide9.xml><?xml version="1.0" encoding="utf-8"?>
+<p:notes xmlns:a="http://schemas.openxmlformats.org/drawingml/2006/main" xmlns:r="http://schemas.openxmlformats.org/officeDocument/2006/relationships" xmlns:p="http://schemas.openxmlformats.org/presentationml/2006/main">
+  <p:cSld>
+    <p:spTree>
+      <p:nvGrpSpPr>
+        <p:cNvPr id="1" name=""/>
+        <p:cNvGrpSpPr/>
+        <p:nvPr/>
+      </p:nvGrpSpPr>
+      <p:grpSpPr>
+        <a:xfrm>
+          <a:off x="0" y="0"/>
+          <a:ext cx="0" cy="0"/>
+          <a:chOff x="0" y="0"/>
+          <a:chExt cx="0" cy="0"/>
+        </a:xfrm>
+      </p:grpSpPr>
+      <p:sp>
+        <p:nvSpPr>
+          <p:cNvPr id="2" name="Espace réservé de l'image des diapositives 1"/>
+          <p:cNvSpPr>
+            <a:spLocks noGrp="1" noRot="1" noChangeAspect="1"/>
+          </p:cNvSpPr>
+          <p:nvPr>
+            <p:ph type="sldImg"/>
+          </p:nvPr>
+        </p:nvSpPr>
+        <p:spPr/>
+      </p:sp>
+      <p:sp>
+        <p:nvSpPr>
+          <p:cNvPr id="3" name="Espace réservé des commentaires 2"/>
+          <p:cNvSpPr>
+            <a:spLocks noGrp="1"/>
+          </p:cNvSpPr>
+          <p:nvPr>
+            <p:ph type="body" idx="1"/>
+          </p:nvPr>
+        </p:nvSpPr>
+        <p:spPr/>
+        <p:txBody>
+          <a:bodyPr/>
+          <a:lstStyle/>
+          <a:p>
+            <a:r>
+              <a:rPr lang="fr-FR" dirty="0" smtClean="0"/>
+              <a:t>Méthode agile : commanditaire</a:t>
+            </a:r>
+            <a:r>
+              <a:rPr lang="fr-FR" baseline="0" dirty="0" smtClean="0"/>
+              <a:t> impliqué dans le projet, réunions fréquentes, les acteurs savent précisément ce que les autres font</a:t>
+            </a:r>
+          </a:p>
+          <a:p>
+            <a:r>
+              <a:rPr lang="fr-FR" baseline="0" dirty="0" smtClean="0"/>
+              <a:t>Sur </a:t>
+            </a:r>
+            <a:r>
+              <a:rPr lang="fr-FR" baseline="0" dirty="0" err="1" smtClean="0"/>
+              <a:t>GitHub</a:t>
+            </a:r>
+            <a:r>
+              <a:rPr lang="fr-FR" baseline="0" dirty="0" smtClean="0"/>
+              <a:t>, on a tout, gestion de projet en /doc/</a:t>
+            </a:r>
+            <a:r>
+              <a:rPr lang="fr-FR" baseline="0" dirty="0" err="1" smtClean="0"/>
+              <a:t>proj</a:t>
+            </a:r>
+            <a:endParaRPr lang="fr-FR" dirty="0" smtClean="0"/>
+          </a:p>
+          <a:p>
+            <a:endParaRPr lang="fr-FR" dirty="0"/>
+          </a:p>
+        </p:txBody>
+      </p:sp>
+      <p:sp>
+        <p:nvSpPr>
+          <p:cNvPr id="4" name="Espace réservé du numéro de diapositive 3"/>
+          <p:cNvSpPr>
+            <a:spLocks noGrp="1"/>
+          </p:cNvSpPr>
+          <p:nvPr>
+            <p:ph type="sldNum" sz="quarter" idx="10"/>
+          </p:nvPr>
+        </p:nvSpPr>
+        <p:spPr/>
+        <p:txBody>
+          <a:bodyPr/>
+          <a:lstStyle/>
+          <a:p>
+            <a:fld id="{67CECCD7-22E7-4EC2-A4CB-540BF85E41A4}" type="slidenum">
+              <a:rPr lang="fr-FR" smtClean="0"/>
+              <a:pPr/>
+              <a:t>18</a:t>
+            </a:fld>
+            <a:endParaRPr lang="fr-FR"/>
+          </a:p>
+        </p:txBody>
+      </p:sp>
+    </p:spTree>
+    <p:extLst>
+      <p:ext uri="{BB962C8B-B14F-4D97-AF65-F5344CB8AC3E}">
+        <p14:creationId xmlns:p14="http://schemas.microsoft.com/office/powerpoint/2010/main" val="1643535083"/>
       </p:ext>
     </p:extLst>
   </p:cSld>
@@ -1593,11 +1968,7 @@
             </a:r>
             <a:r>
               <a:rPr lang="fr-FR" sz="2700" b="1" baseline="0" dirty="0" smtClean="0"/>
-              <a:t> </a:t>
-            </a:r>
-            <a:r>
-              <a:rPr lang="fr-FR" sz="2700" b="1" baseline="0" dirty="0" smtClean="0"/>
-              <a:t>technique : structure de données</a:t>
+              <a:t> technique : structure de données</a:t>
             </a:r>
             <a:endParaRPr lang="fr-FR" sz="2700" b="1" dirty="0"/>
           </a:p>
@@ -31159,7 +31530,6 @@
               <a:rPr lang="fr-FR" sz="2000" dirty="0" smtClean="0"/>
               <a:t>Commanditaire :</a:t>
             </a:r>
-            <a:endParaRPr lang="fr-FR" sz="2000" dirty="0" smtClean="0"/>
           </a:p>
           <a:p>
             <a:r>
@@ -33166,8 +33536,8 @@
           </a:p>
         </p:txBody>
       </p:sp>
-      <mc:AlternateContent xmlns:mc="http://schemas.openxmlformats.org/markup-compatibility/2006">
-        <mc:Choice xmlns:a14="http://schemas.microsoft.com/office/drawing/2010/main" Requires="a14">
+      <mc:AlternateContent xmlns:mc="http://schemas.openxmlformats.org/markup-compatibility/2006" xmlns:a14="http://schemas.microsoft.com/office/drawing/2010/main">
+        <mc:Choice Requires="a14">
           <p:graphicFrame>
             <p:nvGraphicFramePr>
               <p:cNvPr id="3" name="Tableau 2"/>
@@ -33700,7 +34070,7 @@
             </a:graphic>
           </p:graphicFrame>
         </mc:Choice>
-        <mc:Fallback>
+        <mc:Fallback xmlns="">
           <p:graphicFrame>
             <p:nvGraphicFramePr>
               <p:cNvPr id="3" name="Tableau 2"/>
@@ -37392,7 +37762,7 @@
             <p:nvPr/>
           </p:nvPicPr>
           <p:blipFill>
-            <a:blip r:embed="rId2">
+            <a:blip r:embed="rId3">
               <a:extLst>
                 <a:ext uri="{28A0092B-C50C-407E-A947-70E740481C1C}">
                   <a14:useLocalDpi xmlns:a14="http://schemas.microsoft.com/office/drawing/2010/main" val="0"/>
@@ -38055,11 +38425,7 @@
             <a:pPr algn="r"/>
             <a:r>
               <a:rPr lang="fr-FR" sz="1200" dirty="0" smtClean="0"/>
-              <a:t>8</a:t>
-            </a:r>
-            <a:r>
-              <a:rPr lang="fr-FR" sz="1200" dirty="0" smtClean="0"/>
-              <a:t>/18</a:t>
+              <a:t>8/18</a:t>
             </a:r>
             <a:endParaRPr lang="fr-FR" sz="1200" dirty="0"/>
           </a:p>

</xml_diff>